<commit_message>
Modified version control presentation
</commit_message>
<xml_diff>
--- a/01.version-control-systems.pptx
+++ b/01.version-control-systems.pptx
@@ -288,7 +288,7 @@
           <a:p>
             <a:fld id="{256AC515-5B42-4B51-A323-E7D8B19ECCDD}" type="datetimeFigureOut">
               <a:rPr lang="en-US" smtClean="0"/>
-              <a:t>11/9/2014</a:t>
+              <a:t>10-Nov-14</a:t>
             </a:fld>
             <a:endParaRPr lang="en-US"/>
           </a:p>
@@ -600,7 +600,7 @@
           <a:p>
             <a:fld id="{256AC515-5B42-4B51-A323-E7D8B19ECCDD}" type="datetimeFigureOut">
               <a:rPr lang="en-US" smtClean="0"/>
-              <a:t>11/9/2014</a:t>
+              <a:t>10-Nov-14</a:t>
             </a:fld>
             <a:endParaRPr lang="en-US"/>
           </a:p>
@@ -822,7 +822,7 @@
           <a:p>
             <a:fld id="{256AC515-5B42-4B51-A323-E7D8B19ECCDD}" type="datetimeFigureOut">
               <a:rPr lang="en-US" smtClean="0"/>
-              <a:t>11/9/2014</a:t>
+              <a:t>10-Nov-14</a:t>
             </a:fld>
             <a:endParaRPr lang="en-US"/>
           </a:p>
@@ -1113,7 +1113,7 @@
           <a:p>
             <a:fld id="{256AC515-5B42-4B51-A323-E7D8B19ECCDD}" type="datetimeFigureOut">
               <a:rPr lang="en-US" smtClean="0"/>
-              <a:t>11/9/2014</a:t>
+              <a:t>10-Nov-14</a:t>
             </a:fld>
             <a:endParaRPr lang="en-US"/>
           </a:p>
@@ -1567,7 +1567,7 @@
           <a:p>
             <a:fld id="{256AC515-5B42-4B51-A323-E7D8B19ECCDD}" type="datetimeFigureOut">
               <a:rPr lang="en-US" smtClean="0"/>
-              <a:t>11/9/2014</a:t>
+              <a:t>10-Nov-14</a:t>
             </a:fld>
             <a:endParaRPr lang="en-US"/>
           </a:p>
@@ -2143,7 +2143,7 @@
           <a:p>
             <a:fld id="{256AC515-5B42-4B51-A323-E7D8B19ECCDD}" type="datetimeFigureOut">
               <a:rPr lang="en-US" smtClean="0"/>
-              <a:t>11/9/2014</a:t>
+              <a:t>10-Nov-14</a:t>
             </a:fld>
             <a:endParaRPr lang="en-US"/>
           </a:p>
@@ -2995,7 +2995,7 @@
           <a:p>
             <a:fld id="{256AC515-5B42-4B51-A323-E7D8B19ECCDD}" type="datetimeFigureOut">
               <a:rPr lang="en-US" smtClean="0"/>
-              <a:t>11/9/2014</a:t>
+              <a:t>10-Nov-14</a:t>
             </a:fld>
             <a:endParaRPr lang="en-US"/>
           </a:p>
@@ -3200,7 +3200,7 @@
           <a:p>
             <a:fld id="{256AC515-5B42-4B51-A323-E7D8B19ECCDD}" type="datetimeFigureOut">
               <a:rPr lang="en-US" smtClean="0"/>
-              <a:t>11/9/2014</a:t>
+              <a:t>10-Nov-14</a:t>
             </a:fld>
             <a:endParaRPr lang="en-US"/>
           </a:p>
@@ -3414,7 +3414,7 @@
           <a:p>
             <a:fld id="{256AC515-5B42-4B51-A323-E7D8B19ECCDD}" type="datetimeFigureOut">
               <a:rPr lang="en-US" smtClean="0"/>
-              <a:t>11/9/2014</a:t>
+              <a:t>10-Nov-14</a:t>
             </a:fld>
             <a:endParaRPr lang="en-US"/>
           </a:p>
@@ -3619,7 +3619,7 @@
           <a:p>
             <a:fld id="{256AC515-5B42-4B51-A323-E7D8B19ECCDD}" type="datetimeFigureOut">
               <a:rPr lang="en-US" smtClean="0"/>
-              <a:t>11/9/2014</a:t>
+              <a:t>10-Nov-14</a:t>
             </a:fld>
             <a:endParaRPr lang="en-US"/>
           </a:p>
@@ -3899,7 +3899,7 @@
           <a:p>
             <a:fld id="{256AC515-5B42-4B51-A323-E7D8B19ECCDD}" type="datetimeFigureOut">
               <a:rPr lang="en-US" smtClean="0"/>
-              <a:t>11/9/2014</a:t>
+              <a:t>10-Nov-14</a:t>
             </a:fld>
             <a:endParaRPr lang="en-US"/>
           </a:p>
@@ -4166,7 +4166,7 @@
           <a:p>
             <a:fld id="{256AC515-5B42-4B51-A323-E7D8B19ECCDD}" type="datetimeFigureOut">
               <a:rPr lang="en-US" smtClean="0"/>
-              <a:t>11/9/2014</a:t>
+              <a:t>10-Nov-14</a:t>
             </a:fld>
             <a:endParaRPr lang="en-US"/>
           </a:p>
@@ -4581,7 +4581,7 @@
           <a:p>
             <a:fld id="{256AC515-5B42-4B51-A323-E7D8B19ECCDD}" type="datetimeFigureOut">
               <a:rPr lang="en-US" smtClean="0"/>
-              <a:t>11/9/2014</a:t>
+              <a:t>10-Nov-14</a:t>
             </a:fld>
             <a:endParaRPr lang="en-US"/>
           </a:p>
@@ -4729,7 +4729,7 @@
           <a:p>
             <a:fld id="{256AC515-5B42-4B51-A323-E7D8B19ECCDD}" type="datetimeFigureOut">
               <a:rPr lang="en-US" smtClean="0"/>
-              <a:t>11/9/2014</a:t>
+              <a:t>10-Nov-14</a:t>
             </a:fld>
             <a:endParaRPr lang="en-US"/>
           </a:p>
@@ -4854,7 +4854,7 @@
           <a:p>
             <a:fld id="{256AC515-5B42-4B51-A323-E7D8B19ECCDD}" type="datetimeFigureOut">
               <a:rPr lang="en-US" smtClean="0"/>
-              <a:t>11/9/2014</a:t>
+              <a:t>10-Nov-14</a:t>
             </a:fld>
             <a:endParaRPr lang="en-US"/>
           </a:p>
@@ -5133,7 +5133,7 @@
           <a:p>
             <a:fld id="{256AC515-5B42-4B51-A323-E7D8B19ECCDD}" type="datetimeFigureOut">
               <a:rPr lang="en-US" smtClean="0"/>
-              <a:t>11/9/2014</a:t>
+              <a:t>10-Nov-14</a:t>
             </a:fld>
             <a:endParaRPr lang="en-US"/>
           </a:p>
@@ -5445,7 +5445,7 @@
           <a:p>
             <a:fld id="{256AC515-5B42-4B51-A323-E7D8B19ECCDD}" type="datetimeFigureOut">
               <a:rPr lang="en-US" smtClean="0"/>
-              <a:t>11/9/2014</a:t>
+              <a:t>10-Nov-14</a:t>
             </a:fld>
             <a:endParaRPr lang="en-US"/>
           </a:p>
@@ -5698,7 +5698,7 @@
           <a:p>
             <a:fld id="{256AC515-5B42-4B51-A323-E7D8B19ECCDD}" type="datetimeFigureOut">
               <a:rPr lang="en-US" smtClean="0"/>
-              <a:t>11/9/2014</a:t>
+              <a:t>10-Nov-14</a:t>
             </a:fld>
             <a:endParaRPr lang="en-US"/>
           </a:p>
@@ -6757,7 +6757,11 @@
           <a:p>
             <a:r>
               <a:rPr lang="en-US" dirty="0" smtClean="0"/>
-              <a:t>Win merge – </a:t>
+              <a:t>Kdiff3 </a:t>
+            </a:r>
+            <a:r>
+              <a:rPr lang="en-US" dirty="0" smtClean="0"/>
+              <a:t>– </a:t>
             </a:r>
             <a:r>
               <a:rPr lang="bg-BG" dirty="0" smtClean="0"/>

</xml_diff>